<commit_message>
add more things to ppt.
</commit_message>
<xml_diff>
--- a/Cat Idle Game.pptx
+++ b/Cat Idle Game.pptx
@@ -205,7 +205,7 @@
           <a:p>
             <a:fld id="{84843EC8-2F45-4A1A-95C8-D905FB93A2FF}" type="datetimeFigureOut">
               <a:rPr lang="en-US" smtClean="0"/>
-              <a:t>5/6/2020</a:t>
+              <a:t>5/6/20</a:t>
             </a:fld>
             <a:endParaRPr lang="en-US"/>
           </a:p>
@@ -977,7 +977,7 @@
             <a:fld id="{65D281B3-CF9F-4DAF-9ED9-68D14E0ED4E3}" type="datetime1">
               <a:rPr lang="en-US" smtClean="0"/>
               <a:pPr/>
-              <a:t>5/6/2020</a:t>
+              <a:t>5/6/20</a:t>
             </a:fld>
             <a:endParaRPr lang="en-US"/>
           </a:p>
@@ -1187,7 +1187,7 @@
             <a:fld id="{C2379E68-8449-45AD-9D4F-7BD5CF91A5EC}" type="datetime1">
               <a:rPr lang="en-US" smtClean="0"/>
               <a:pPr/>
-              <a:t>5/6/2020</a:t>
+              <a:t>5/6/20</a:t>
             </a:fld>
             <a:endParaRPr lang="en-US"/>
           </a:p>
@@ -1445,7 +1445,7 @@
             <a:fld id="{EAC65793-E051-4E82-98BA-AFD651DD3533}" type="datetime1">
               <a:rPr lang="en-US" smtClean="0"/>
               <a:pPr/>
-              <a:t>5/6/2020</a:t>
+              <a:t>5/6/20</a:t>
             </a:fld>
             <a:endParaRPr lang="en-US"/>
           </a:p>
@@ -1621,7 +1621,7 @@
             <a:fld id="{BFB9A1B6-FBEA-451E-9B7C-804BB57A94DE}" type="datetime1">
               <a:rPr lang="en-US" smtClean="0"/>
               <a:pPr/>
-              <a:t>5/6/2020</a:t>
+              <a:t>5/6/20</a:t>
             </a:fld>
             <a:endParaRPr lang="en-US"/>
           </a:p>
@@ -1966,7 +1966,7 @@
             <a:fld id="{D638F0DB-1DF8-4F96-866D-353E880133E8}" type="datetime1">
               <a:rPr lang="en-US" smtClean="0"/>
               <a:pPr/>
-              <a:t>5/6/2020</a:t>
+              <a:t>5/6/20</a:t>
             </a:fld>
             <a:endParaRPr lang="en-US"/>
           </a:p>
@@ -2243,7 +2243,7 @@
             <a:fld id="{0E331B4B-1DCD-4BAC-A568-79F800D6CF60}" type="datetime1">
               <a:rPr lang="en-US" smtClean="0"/>
               <a:pPr/>
-              <a:t>5/6/2020</a:t>
+              <a:t>5/6/20</a:t>
             </a:fld>
             <a:endParaRPr lang="en-US"/>
           </a:p>
@@ -2624,7 +2624,7 @@
             <a:fld id="{B08E2133-BF97-4F25-8E1B-3EC8C6554505}" type="datetime1">
               <a:rPr lang="en-US" smtClean="0"/>
               <a:pPr/>
-              <a:t>5/6/2020</a:t>
+              <a:t>5/6/20</a:t>
             </a:fld>
             <a:endParaRPr lang="en-US"/>
           </a:p>
@@ -2744,7 +2744,7 @@
             <a:fld id="{724E3AA7-6E7F-4FA5-BB68-1042D6074F5D}" type="datetime1">
               <a:rPr lang="en-US" smtClean="0"/>
               <a:pPr/>
-              <a:t>5/6/2020</a:t>
+              <a:t>5/6/20</a:t>
             </a:fld>
             <a:endParaRPr lang="en-US"/>
           </a:p>
@@ -2917,7 +2917,7 @@
             <a:fld id="{ECD9AF43-C63A-4E89-B5D3-11E6D51088A3}" type="datetime1">
               <a:rPr lang="en-US" smtClean="0"/>
               <a:pPr/>
-              <a:t>5/6/2020</a:t>
+              <a:t>5/6/20</a:t>
             </a:fld>
             <a:endParaRPr lang="en-US"/>
           </a:p>
@@ -3273,7 +3273,7 @@
             <a:fld id="{690D2183-C6DB-4505-8840-A353630350DD}" type="datetime1">
               <a:rPr lang="en-US" smtClean="0"/>
               <a:pPr/>
-              <a:t>5/6/2020</a:t>
+              <a:t>5/6/20</a:t>
             </a:fld>
             <a:endParaRPr lang="en-US"/>
           </a:p>
@@ -3669,7 +3669,7 @@
             <a:fld id="{F0295517-7AB5-481E-BF59-72694B0607A1}" type="datetime1">
               <a:rPr lang="en-US" smtClean="0"/>
               <a:pPr/>
-              <a:t>5/6/2020</a:t>
+              <a:t>5/6/20</a:t>
             </a:fld>
             <a:endParaRPr lang="en-US"/>
           </a:p>
@@ -3958,7 +3958,7 @@
             <a:fld id="{1B15B3F0-0514-436E-8CB4-8568D1430955}" type="datetime1">
               <a:rPr lang="en-US" smtClean="0"/>
               <a:pPr/>
-              <a:t>5/6/2020</a:t>
+              <a:t>5/6/20</a:t>
             </a:fld>
             <a:endParaRPr lang="en-US"/>
           </a:p>
@@ -5217,7 +5217,7 @@
                 <a:latin typeface="Verdana" panose="020B0604030504040204" pitchFamily="34" charset="0"/>
                 <a:ea typeface="Verdana" panose="020B0604030504040204" pitchFamily="34" charset="0"/>
               </a:rPr>
-              <a:t>One hour in real life represents one year in game. The year is divided into four seasons: spring, summer, fall, and winter. Each season lasts for 15 minutes.</a:t>
+              <a:t>Speed up feature costs $100, it boosts the seed growing process also will speed up the catnip consumption by 5x faster</a:t>
             </a:r>
           </a:p>
           <a:p>
@@ -5233,7 +5233,7 @@
                 <a:latin typeface="Verdana" panose="020B0604030504040204" pitchFamily="34" charset="0"/>
                 <a:ea typeface="Verdana" panose="020B0604030504040204" pitchFamily="34" charset="0"/>
               </a:rPr>
-              <a:t>A planted seed will become ripe after 5 minutes in spring, 3 minutes in summer, 1 minute in fall, and 10 minutes in winter.</a:t>
+              <a:t>TopUp provides a option that user can buy the game currency with money</a:t>
             </a:r>
           </a:p>
           <a:p>
@@ -5249,7 +5249,7 @@
                 <a:latin typeface="Verdana" panose="020B0604030504040204" pitchFamily="34" charset="0"/>
                 <a:ea typeface="Verdana" panose="020B0604030504040204" pitchFamily="34" charset="0"/>
               </a:rPr>
-              <a:t>A cat eats 1 catnip per 6 minutes</a:t>
+              <a:t>One hour in real life represents one year in game. The year is divided into four seasons: spring, summer, fall, and winter. Each season lasts for 15 minutes.</a:t>
             </a:r>
           </a:p>
           <a:p>
@@ -5265,35 +5265,39 @@
                 <a:latin typeface="Verdana" panose="020B0604030504040204" pitchFamily="34" charset="0"/>
                 <a:ea typeface="Verdana" panose="020B0604030504040204" pitchFamily="34" charset="0"/>
               </a:rPr>
-              <a:t>If there is no catnip for </a:t>
-            </a:r>
-            <a:r>
-              <a:rPr lang="en-US">
-                <a:latin typeface="Verdana" panose="020B0604030504040204" pitchFamily="34" charset="0"/>
-                <a:ea typeface="Verdana" panose="020B0604030504040204" pitchFamily="34" charset="0"/>
-              </a:rPr>
-              <a:t>the cat </a:t>
-            </a:r>
+              <a:t>A planted seed will become ripe after 5 minutes in spring, 3 minutes in summer, 1 minute in fall, and 10 minutes in winter.</a:t>
+            </a:r>
+          </a:p>
+          <a:p>
+            <a:pPr marL="544068" lvl="1" indent="-342900">
+              <a:lnSpc>
+                <a:spcPct val="100000"/>
+              </a:lnSpc>
+              <a:buFont typeface="+mj-lt"/>
+              <a:buAutoNum type="arabicPeriod"/>
+            </a:pPr>
             <a:r>
               <a:rPr lang="en-US" dirty="0">
                 <a:latin typeface="Verdana" panose="020B0604030504040204" pitchFamily="34" charset="0"/>
                 <a:ea typeface="Verdana" panose="020B0604030504040204" pitchFamily="34" charset="0"/>
               </a:rPr>
-              <a:t>to eat, </a:t>
-            </a:r>
-            <a:r>
-              <a:rPr lang="en-US">
-                <a:latin typeface="Verdana" panose="020B0604030504040204" pitchFamily="34" charset="0"/>
-                <a:ea typeface="Verdana" panose="020B0604030504040204" pitchFamily="34" charset="0"/>
-              </a:rPr>
-              <a:t>the cat </a:t>
-            </a:r>
+              <a:t>A cat eats 1 catnip per 6 minutes</a:t>
+            </a:r>
+          </a:p>
+          <a:p>
+            <a:pPr marL="544068" lvl="1" indent="-342900">
+              <a:lnSpc>
+                <a:spcPct val="100000"/>
+              </a:lnSpc>
+              <a:buFont typeface="+mj-lt"/>
+              <a:buAutoNum type="arabicPeriod"/>
+            </a:pPr>
             <a:r>
               <a:rPr lang="en-US" dirty="0">
                 <a:latin typeface="Verdana" panose="020B0604030504040204" pitchFamily="34" charset="0"/>
                 <a:ea typeface="Verdana" panose="020B0604030504040204" pitchFamily="34" charset="0"/>
               </a:rPr>
-              <a:t>will die, and the player will fail the mission. </a:t>
+              <a:t>If there is no catnip for the cat to eat, the cat will die, and the player will fail the mission. </a:t>
             </a:r>
           </a:p>
           <a:p>

</xml_diff>